<commit_message>
improved the video concept
</commit_message>
<xml_diff>
--- a/film/Filmkonzept.pptx
+++ b/film/Filmkonzept.pptx
@@ -4137,6 +4137,12 @@
           <a:p>
             <a:r>
               <a:rPr lang="de-DE" dirty="0"/>
+              <a:t>ZEITUNGSINSERATE</a:t>
+            </a:r>
+          </a:p>
+          <a:p>
+            <a:r>
+              <a:rPr lang="de-DE" dirty="0"/>
               <a:t>KIND SPIELT IM GARTEN</a:t>
             </a:r>
           </a:p>
@@ -4648,10 +4654,9 @@
           </a:p>
           <a:p>
             <a:r>
-              <a:rPr lang="de-DE"/>
+              <a:rPr lang="de-DE" dirty="0"/>
               <a:t>LAPTOP</a:t>
             </a:r>
-            <a:endParaRPr lang="de-DE" dirty="0"/>
           </a:p>
           <a:p>
             <a:endParaRPr lang="de-DE" dirty="0"/>

</xml_diff>